<commit_message>
working on module 4
</commit_message>
<xml_diff>
--- a/Modules/03.TaskListingScreen.CompletedSetup/03.TaskListingScreen.CompletedSetup.Slides.pptx
+++ b/Modules/03.TaskListingScreen.CompletedSetup/03.TaskListingScreen.CompletedSetup.Slides.pptx
@@ -323,7 +323,7 @@
             <a:fld id="{923FAA13-3E1B-4A40-BCE0-2A4101C91A56}" type="datetimeFigureOut">
               <a:rPr lang="en-US" smtClean="0"/>
               <a:pPr/>
-              <a:t>3/21/2013</a:t>
+              <a:t>3/30/2013</a:t>
             </a:fld>
             <a:endParaRPr lang="en-US"/>
           </a:p>
@@ -904,15 +904,7 @@
           <a:p>
             <a:r>
               <a:rPr lang="en-US" dirty="0" smtClean="0"/>
-              <a:t>Hello and welcome to module </a:t>
-            </a:r>
-            <a:r>
-              <a:rPr lang="en-US" dirty="0" smtClean="0"/>
-              <a:t>3 </a:t>
-            </a:r>
-            <a:r>
-              <a:rPr lang="en-US" dirty="0" smtClean="0"/>
-              <a:t>of Html for the XAML developer</a:t>
+              <a:t>Hello and welcome to module 3 of Html for the XAML developer</a:t>
             </a:r>
           </a:p>
           <a:p>
@@ -938,11 +930,7 @@
             </a:pPr>
             <a:r>
               <a:rPr lang="en-US" dirty="0" smtClean="0"/>
-              <a:t>In this module we </a:t>
-            </a:r>
-            <a:r>
-              <a:rPr lang="en-US" dirty="0" smtClean="0"/>
-              <a:t>are going</a:t>
+              <a:t>In this module we are going</a:t>
             </a:r>
             <a:r>
               <a:rPr lang="en-US" baseline="0" dirty="0" smtClean="0"/>
@@ -956,7 +944,6 @@
               <a:rPr lang="en-US" baseline="0" dirty="0" smtClean="0"/>
               <a:t> Listing screen.  However this time we are going to focus on the secondary items on the screen such as the filtering of data and more styling. Lets go ahead and get started.</a:t>
             </a:r>
-            <a:endParaRPr lang="en-US" baseline="0" dirty="0" smtClean="0"/>
           </a:p>
         </p:txBody>
       </p:sp>
@@ -1586,23 +1573,7 @@
             </a:r>
             <a:r>
               <a:rPr lang="en-US" baseline="0" dirty="0" smtClean="0"/>
-              <a:t> a </a:t>
-            </a:r>
-            <a:r>
-              <a:rPr lang="en-US" baseline="0" dirty="0" smtClean="0"/>
-              <a:t>module 2 </a:t>
-            </a:r>
-            <a:r>
-              <a:rPr lang="en-US" baseline="0" dirty="0" smtClean="0"/>
-              <a:t>we took a look at how to change a UI style by using a custom observable.  Now we are going to look at a different, more reusable way to accomplish </a:t>
-            </a:r>
-            <a:r>
-              <a:rPr lang="en-US" baseline="0" dirty="0" smtClean="0"/>
-              <a:t>this task </a:t>
-            </a:r>
-            <a:r>
-              <a:rPr lang="en-US" baseline="0" dirty="0" smtClean="0"/>
-              <a:t>now by creating a custom knockout binding.</a:t>
+              <a:t> a module 2 we took a look at how to change a UI style by using a custom observable.  Now we are going to look at a different, more reusable way to accomplish this task now by creating a custom knockout binding.</a:t>
             </a:r>
             <a:endParaRPr lang="en-US" dirty="0"/>
           </a:p>
@@ -2002,15 +1973,7 @@
             </a:r>
             <a:r>
               <a:rPr lang="en-US" baseline="0" dirty="0" smtClean="0"/>
-              <a:t> to visibility </a:t>
-            </a:r>
-            <a:r>
-              <a:rPr lang="en-US" baseline="0" dirty="0" smtClean="0"/>
-              <a:t>converter to drive the visibility of your UI elements based on a property in your view model..  </a:t>
-            </a:r>
-            <a:r>
-              <a:rPr lang="en-US" baseline="0" dirty="0" smtClean="0"/>
-              <a:t>We can accomplish this same result via knockout but with less code.</a:t>
+              <a:t> to visibility converter to drive the visibility of your UI elements based on a property in your view model..  We can accomplish this same result via knockout but with less code.</a:t>
             </a:r>
             <a:endParaRPr lang="en-US" dirty="0"/>
           </a:p>
@@ -3974,7 +3937,6 @@
               <a:rPr lang="en-US" baseline="0" dirty="0" smtClean="0"/>
               <a:t>Finally we will take a look at how we can use computed values to generate a summary field in our application.  We will compare the difference between using knockout to compute our values to using a View Model property in Silverlight.</a:t>
             </a:r>
-            <a:endParaRPr lang="en-US" baseline="0" dirty="0" smtClean="0"/>
           </a:p>
         </p:txBody>
       </p:sp>
@@ -4066,11 +4028,7 @@
           <a:p>
             <a:r>
               <a:rPr lang="en-US" dirty="0" smtClean="0"/>
-              <a:t>In this module we </a:t>
-            </a:r>
-            <a:r>
-              <a:rPr lang="en-US" dirty="0" smtClean="0"/>
-              <a:t>continued</a:t>
+              <a:t>In this module we continued</a:t>
             </a:r>
             <a:r>
               <a:rPr lang="en-US" baseline="0" dirty="0" smtClean="0"/>
@@ -4093,7 +4051,6 @@
               <a:rPr lang="en-US" baseline="0" dirty="0" smtClean="0"/>
               <a:t>These items included</a:t>
             </a:r>
-            <a:endParaRPr lang="en-US" baseline="0" dirty="0" smtClean="0"/>
           </a:p>
           <a:p>
             <a:endParaRPr lang="en-US" baseline="0" dirty="0" smtClean="0"/>
@@ -4103,7 +4060,6 @@
               <a:rPr lang="en-US" baseline="0" dirty="0" smtClean="0"/>
               <a:t>Learning how to setup 2way, real time binding in knockout to update your backing properties.</a:t>
             </a:r>
-            <a:endParaRPr lang="en-US" baseline="0" dirty="0" smtClean="0"/>
           </a:p>
           <a:p>
             <a:endParaRPr lang="en-US" baseline="0" dirty="0" smtClean="0"/>
@@ -4121,21 +4077,15 @@
               <a:rPr lang="en-US" baseline="0" dirty="0" smtClean="0"/>
               <a:t> to enable filter of data on the client..</a:t>
             </a:r>
+          </a:p>
+          <a:p>
             <a:endParaRPr lang="en-US" baseline="0" dirty="0" smtClean="0"/>
           </a:p>
           <a:p>
-            <a:endParaRPr lang="en-US" baseline="0" dirty="0" smtClean="0"/>
-          </a:p>
-          <a:p>
             <a:r>
               <a:rPr lang="en-US" baseline="0" dirty="0" smtClean="0"/>
-              <a:t>After this </a:t>
-            </a:r>
-            <a:r>
-              <a:rPr lang="en-US" baseline="0" dirty="0" smtClean="0"/>
-              <a:t>explored another way to use knockout to dynamically update the look and feel of your application by creating a custom binding.</a:t>
-            </a:r>
-            <a:endParaRPr lang="en-US" baseline="0" dirty="0" smtClean="0"/>
+              <a:t>After this explored another way to use knockout to dynamically update the look and feel of your application by creating a custom binding.</a:t>
+            </a:r>
           </a:p>
           <a:p>
             <a:endParaRPr lang="en-US" baseline="0" dirty="0" smtClean="0"/>
@@ -4187,19 +4137,14 @@
               <a:rPr lang="en-US" baseline="0" dirty="0" smtClean="0"/>
               <a:t> listing</a:t>
             </a:r>
+          </a:p>
+          <a:p>
             <a:endParaRPr lang="en-US" baseline="0" dirty="0" smtClean="0"/>
           </a:p>
           <a:p>
-            <a:endParaRPr lang="en-US" baseline="0" dirty="0" smtClean="0"/>
-          </a:p>
-          <a:p>
             <a:r>
               <a:rPr lang="en-US" baseline="0" dirty="0" smtClean="0"/>
-              <a:t>In the next module we will </a:t>
-            </a:r>
-            <a:r>
-              <a:rPr lang="en-US" baseline="0" dirty="0" smtClean="0"/>
-              <a:t>focus on learning how we can edit and maintain our individual </a:t>
+              <a:t>In the next module we will focus on learning how we can edit and maintain our individual </a:t>
             </a:r>
             <a:r>
               <a:rPr lang="en-US" baseline="0" dirty="0" err="1" smtClean="0"/>
@@ -4412,15 +4357,7 @@
             </a:r>
             <a:r>
               <a:rPr lang="en-US" baseline="0" dirty="0" smtClean="0"/>
-              <a:t> get our hands dirty </a:t>
-            </a:r>
-            <a:r>
-              <a:rPr lang="en-US" baseline="0" dirty="0" smtClean="0"/>
-              <a:t>again and </a:t>
-            </a:r>
-            <a:r>
-              <a:rPr lang="en-US" baseline="0" dirty="0" smtClean="0"/>
-              <a:t>take a look at how we can handle two way text binding as well as real time when using Knockout. Handing user input via knockout is very , in fact our binding is 2 way be default, which unlike the default in Silverlight.  However, like in Silverlight, our update bindings will NOT fire until you leave the text field, which is a pain, however this is an easily solvable problem.  </a:t>
+              <a:t> get our hands dirty again and take a look at how we can handle two way text binding as well as real time when using Knockout. Handing user input via knockout is very , in fact our binding is 2 way be default, which unlike the default in Silverlight.  However, like in Silverlight, our update bindings will NOT fire until you leave the text field, which is a pain, however this is an easily solvable problem.  </a:t>
             </a:r>
           </a:p>
           <a:p>
@@ -4900,15 +4837,7 @@
           <a:p>
             <a:r>
               <a:rPr lang="en-US" baseline="0" dirty="0" smtClean="0"/>
-              <a:t>When using Knockout there is still some ceremony, but there is no need to create a custom </a:t>
-            </a:r>
-            <a:r>
-              <a:rPr lang="en-US" baseline="0" dirty="0" smtClean="0"/>
-              <a:t>code to </a:t>
-            </a:r>
-            <a:r>
-              <a:rPr lang="en-US" baseline="0" dirty="0" smtClean="0"/>
-              <a:t>handle this ceremony.</a:t>
+              <a:t>When using Knockout there is still some ceremony, but there is no need to create a custom code to handle this ceremony.</a:t>
             </a:r>
           </a:p>
           <a:p>
@@ -10089,9 +10018,6 @@
               </a:rPr>
               <a:t>Use the Visible binding</a:t>
             </a:r>
-            <a:endParaRPr lang="en-US" dirty="0" smtClean="0">
-              <a:latin typeface="+mj-lt"/>
-            </a:endParaRPr>
           </a:p>
         </p:txBody>
       </p:sp>
@@ -10166,9 +10092,6 @@
               </a:rPr>
               <a:t> concepts in JavaScript</a:t>
             </a:r>
-            <a:endParaRPr lang="en-US" dirty="0" smtClean="0">
-              <a:latin typeface="+mj-lt"/>
-            </a:endParaRPr>
           </a:p>
         </p:txBody>
       </p:sp>
@@ -11268,25 +11191,8 @@
                   </a:schemeClr>
                 </a:solidFill>
               </a:rPr>
-              <a:t>Deleting </a:t>
-            </a:r>
-            <a:r>
-              <a:rPr lang="en-GB" dirty="0" smtClean="0">
-                <a:solidFill>
-                  <a:schemeClr val="accent6">
-                    <a:lumMod val="75000"/>
-                  </a:schemeClr>
-                </a:solidFill>
-              </a:rPr>
-              <a:t>Data </a:t>
-            </a:r>
-            <a:endParaRPr lang="en-GB" dirty="0" smtClean="0">
-              <a:solidFill>
-                <a:schemeClr val="accent6">
-                  <a:lumMod val="75000"/>
-                </a:schemeClr>
-              </a:solidFill>
-            </a:endParaRPr>
+              <a:t>Deleting Data </a:t>
+            </a:r>
           </a:p>
           <a:p>
             <a:r>
@@ -11382,7 +11288,6 @@
               <a:rPr lang="en-US" dirty="0" smtClean="0"/>
               <a:t>Making the call in Silverlight</a:t>
             </a:r>
-            <a:endParaRPr lang="en-US" dirty="0" smtClean="0"/>
           </a:p>
           <a:p>
             <a:pPr marL="0" indent="0">
@@ -11511,9 +11416,6 @@
               </a:rPr>
               <a:t>Service to perform the delete</a:t>
             </a:r>
-            <a:endParaRPr lang="en-US" dirty="0" smtClean="0">
-              <a:latin typeface="+mj-lt"/>
-            </a:endParaRPr>
           </a:p>
         </p:txBody>
       </p:sp>
@@ -11551,9 +11453,6 @@
               </a:rPr>
               <a:t>Client to make the service call</a:t>
             </a:r>
-            <a:endParaRPr lang="en-US" dirty="0" smtClean="0">
-              <a:latin typeface="+mj-lt"/>
-            </a:endParaRPr>
           </a:p>
         </p:txBody>
       </p:sp>
@@ -11628,9 +11527,6 @@
               </a:rPr>
               <a:t>Evaluate the response and take some action</a:t>
             </a:r>
-            <a:endParaRPr lang="en-US" dirty="0" smtClean="0">
-              <a:latin typeface="+mj-lt"/>
-            </a:endParaRPr>
           </a:p>
         </p:txBody>
       </p:sp>
@@ -12179,9 +12075,6 @@
               </a:rPr>
               <a:t>Service to perform the delete</a:t>
             </a:r>
-            <a:endParaRPr lang="en-US" dirty="0" smtClean="0">
-              <a:latin typeface="+mj-lt"/>
-            </a:endParaRPr>
           </a:p>
         </p:txBody>
       </p:sp>
@@ -12219,9 +12112,6 @@
               </a:rPr>
               <a:t>Evaluate the response and take some action</a:t>
             </a:r>
-            <a:endParaRPr lang="en-US" dirty="0" smtClean="0">
-              <a:latin typeface="+mj-lt"/>
-            </a:endParaRPr>
           </a:p>
         </p:txBody>
       </p:sp>
@@ -12294,13 +12184,7 @@
               <a:rPr lang="en-US" dirty="0" smtClean="0">
                 <a:latin typeface="+mj-lt"/>
               </a:rPr>
-              <a:t>Make the cal</a:t>
-            </a:r>
-            <a:r>
-              <a:rPr lang="en-US" dirty="0" smtClean="0">
-                <a:latin typeface="+mj-lt"/>
-              </a:rPr>
-              <a:t>l via </a:t>
+              <a:t>Make the call via </a:t>
             </a:r>
             <a:r>
               <a:rPr lang="en-US" dirty="0" err="1" smtClean="0">
@@ -12314,9 +12198,6 @@
               </a:rPr>
               <a:t> and Ajax</a:t>
             </a:r>
-            <a:endParaRPr lang="en-US" dirty="0" smtClean="0">
-              <a:latin typeface="+mj-lt"/>
-            </a:endParaRPr>
           </a:p>
         </p:txBody>
       </p:sp>
@@ -12920,32 +12801,9 @@
           <a:chExt cx="0" cy="0"/>
         </a:xfrm>
       </p:grpSpPr>
-      <p:sp>
-        <p:nvSpPr>
-          <p:cNvPr id="2" name="Title 1"/>
-          <p:cNvSpPr>
-            <a:spLocks noGrp="1"/>
-          </p:cNvSpPr>
-          <p:nvPr>
-            <p:ph type="title"/>
-          </p:nvPr>
-        </p:nvSpPr>
-        <p:spPr/>
-        <p:txBody>
-          <a:bodyPr/>
-          <a:lstStyle/>
-          <a:p>
-            <a:r>
-              <a:rPr lang="en-US" dirty="0" smtClean="0"/>
-              <a:t>Computed Totals</a:t>
-            </a:r>
-            <a:endParaRPr lang="en-US" dirty="0"/>
-          </a:p>
-        </p:txBody>
-      </p:sp>
       <p:pic>
         <p:nvPicPr>
-          <p:cNvPr id="11" name="Picture 10"/>
+          <p:cNvPr id="4" name="Picture 3"/>
           <p:cNvPicPr>
             <a:picLocks noChangeAspect="1"/>
           </p:cNvPicPr>
@@ -12959,14 +12817,37 @@
         </p:blipFill>
         <p:spPr>
           <a:xfrm>
-            <a:off x="623887" y="1447800"/>
-            <a:ext cx="7896225" cy="5006369"/>
+            <a:off x="685800" y="1157287"/>
+            <a:ext cx="8194123" cy="5038725"/>
           </a:xfrm>
           <a:prstGeom prst="rect">
             <a:avLst/>
           </a:prstGeom>
         </p:spPr>
       </p:pic>
+      <p:sp>
+        <p:nvSpPr>
+          <p:cNvPr id="2" name="Title 1"/>
+          <p:cNvSpPr>
+            <a:spLocks noGrp="1"/>
+          </p:cNvSpPr>
+          <p:nvPr>
+            <p:ph type="title"/>
+          </p:nvPr>
+        </p:nvSpPr>
+        <p:spPr/>
+        <p:txBody>
+          <a:bodyPr/>
+          <a:lstStyle/>
+          <a:p>
+            <a:r>
+              <a:rPr lang="en-US" dirty="0" smtClean="0"/>
+              <a:t>Computed Totals</a:t>
+            </a:r>
+            <a:endParaRPr lang="en-US" dirty="0"/>
+          </a:p>
+        </p:txBody>
+      </p:sp>
       <p:cxnSp>
         <p:nvCxnSpPr>
           <p:cNvPr id="15" name="Straight Arrow Connector 14"/>
@@ -12975,7 +12856,7 @@
         </p:nvCxnSpPr>
         <p:spPr bwMode="auto">
           <a:xfrm>
-            <a:off x="4724400" y="6286500"/>
+            <a:off x="4724400" y="6088380"/>
             <a:ext cx="1295400" cy="0"/>
           </a:xfrm>
           <a:prstGeom prst="straightConnector1">
@@ -13012,7 +12893,7 @@
         </p:nvCxnSpPr>
         <p:spPr bwMode="auto">
           <a:xfrm>
-            <a:off x="6686550" y="6370320"/>
+            <a:off x="7092315" y="6172200"/>
             <a:ext cx="152400" cy="0"/>
           </a:xfrm>
           <a:prstGeom prst="line">
@@ -13046,7 +12927,7 @@
         </p:nvCxnSpPr>
         <p:spPr bwMode="auto">
           <a:xfrm>
-            <a:off x="7366635" y="6370320"/>
+            <a:off x="7772400" y="6172200"/>
             <a:ext cx="152400" cy="0"/>
           </a:xfrm>
           <a:prstGeom prst="line">
@@ -13080,7 +12961,7 @@
         </p:nvCxnSpPr>
         <p:spPr bwMode="auto">
           <a:xfrm>
-            <a:off x="8052435" y="6370320"/>
+            <a:off x="8458200" y="6172200"/>
             <a:ext cx="152400" cy="0"/>
           </a:xfrm>
           <a:prstGeom prst="line">
@@ -13415,9 +13296,6 @@
               </a:rPr>
               <a:t>Raise Notifications to the UI to rebind the properties</a:t>
             </a:r>
-            <a:endParaRPr lang="en-US" dirty="0" smtClean="0">
-              <a:latin typeface="+mj-lt"/>
-            </a:endParaRPr>
           </a:p>
         </p:txBody>
       </p:sp>
@@ -13540,9 +13418,6 @@
               </a:rPr>
               <a:t>Backing field to calculate the summary values</a:t>
             </a:r>
-            <a:endParaRPr lang="en-US" dirty="0" smtClean="0">
-              <a:latin typeface="+mj-lt"/>
-            </a:endParaRPr>
           </a:p>
         </p:txBody>
       </p:sp>
@@ -14008,9 +13883,6 @@
               </a:rPr>
               <a:t>Declare our Knockout computed fields</a:t>
             </a:r>
-            <a:endParaRPr lang="en-US" dirty="0" smtClean="0">
-              <a:latin typeface="+mj-lt"/>
-            </a:endParaRPr>
           </a:p>
         </p:txBody>
       </p:sp>
@@ -14085,9 +13957,6 @@
               </a:rPr>
               <a:t>Computed field using underscore JS to summarize the value</a:t>
             </a:r>
-            <a:endParaRPr lang="en-US" dirty="0" smtClean="0">
-              <a:latin typeface="+mj-lt"/>
-            </a:endParaRPr>
           </a:p>
         </p:txBody>
       </p:sp>
@@ -14266,9 +14135,6 @@
               </a:rPr>
               <a:t> collection is modified</a:t>
             </a:r>
-            <a:endParaRPr lang="en-US" dirty="0" smtClean="0">
-              <a:latin typeface="+mj-lt"/>
-            </a:endParaRPr>
           </a:p>
         </p:txBody>
       </p:sp>
@@ -15662,6 +15528,36 @@
           <a:chExt cx="0" cy="0"/>
         </a:xfrm>
       </p:grpSpPr>
+      <p:pic>
+        <p:nvPicPr>
+          <p:cNvPr id="3" name="Picture 2"/>
+          <p:cNvPicPr>
+            <a:picLocks noChangeAspect="1"/>
+          </p:cNvPicPr>
+          <p:nvPr/>
+        </p:nvPicPr>
+        <p:blipFill>
+          <a:blip r:embed="rId3">
+            <a:extLst>
+              <a:ext uri="{28A0092B-C50C-407E-A947-70E740481C1C}">
+                <a14:useLocalDpi xmlns:a14="http://schemas.microsoft.com/office/drawing/2010/main" val="0"/>
+              </a:ext>
+            </a:extLst>
+          </a:blip>
+          <a:stretch>
+            <a:fillRect/>
+          </a:stretch>
+        </p:blipFill>
+        <p:spPr>
+          <a:xfrm>
+            <a:off x="1066800" y="1096296"/>
+            <a:ext cx="7010400" cy="5262939"/>
+          </a:xfrm>
+          <a:prstGeom prst="rect">
+            <a:avLst/>
+          </a:prstGeom>
+        </p:spPr>
+      </p:pic>
       <p:sp>
         <p:nvSpPr>
           <p:cNvPr id="2" name="Title 1"/>
@@ -15685,30 +15581,6 @@
           </a:p>
         </p:txBody>
       </p:sp>
-      <p:pic>
-        <p:nvPicPr>
-          <p:cNvPr id="4" name="Picture 3"/>
-          <p:cNvPicPr>
-            <a:picLocks noChangeAspect="1"/>
-          </p:cNvPicPr>
-          <p:nvPr/>
-        </p:nvPicPr>
-        <p:blipFill>
-          <a:blip r:embed="rId3"/>
-          <a:stretch>
-            <a:fillRect/>
-          </a:stretch>
-        </p:blipFill>
-        <p:spPr>
-          <a:xfrm>
-            <a:off x="623887" y="1371600"/>
-            <a:ext cx="7896225" cy="5006369"/>
-          </a:xfrm>
-          <a:prstGeom prst="rect">
-            <a:avLst/>
-          </a:prstGeom>
-        </p:spPr>
-      </p:pic>
       <p:cxnSp>
         <p:nvCxnSpPr>
           <p:cNvPr id="7" name="Straight Arrow Connector 6"/>

</xml_diff>